<commit_message>
updated slide deck so it is generic for all future workshops, as well as the revolving welcome slide deck
</commit_message>
<xml_diff>
--- a/WelcomeSlidesRevolving.pptx
+++ b/WelcomeSlidesRevolving.pptx
@@ -6,13 +6,12 @@
     <p:sldMasterId id="2147483683" r:id="rId2"/>
   </p:sldMasterIdLst>
   <p:notesMasterIdLst>
-    <p:notesMasterId r:id="rId7"/>
+    <p:notesMasterId r:id="rId6"/>
   </p:notesMasterIdLst>
   <p:sldIdLst>
     <p:sldId id="256" r:id="rId3"/>
     <p:sldId id="257" r:id="rId4"/>
     <p:sldId id="258" r:id="rId5"/>
-    <p:sldId id="259" r:id="rId6"/>
   </p:sldIdLst>
   <p:sldSz cx="9144000" cy="6858000" type="screen4x3"/>
   <p:notesSz cx="6858000" cy="9144000"/>
@@ -218,6 +217,11 @@
       </a:defRPr>
     </a:lvl9pPr>
   </p:defaultTextStyle>
+  <p:extLst>
+    <p:ext uri="{EFAFB233-063F-42B5-8137-9DF3F51BA10A}">
+      <p15:sldGuideLst xmlns:p15="http://schemas.microsoft.com/office/powerpoint/2012/main"/>
+    </p:ext>
+  </p:extLst>
 </p:presentation>
 </file>
 
@@ -1757,11 +1761,11 @@
   <p:clrMapOvr>
     <a:masterClrMapping/>
   </p:clrMapOvr>
-  <mc:AlternateContent xmlns:mc="http://schemas.openxmlformats.org/markup-compatibility/2006">
-    <mc:Choice xmlns:p14="http://schemas.microsoft.com/office/powerpoint/2010/main" Requires="p14">
+  <mc:AlternateContent xmlns:mc="http://schemas.openxmlformats.org/markup-compatibility/2006" xmlns:p14="http://schemas.microsoft.com/office/powerpoint/2010/main">
+    <mc:Choice Requires="p14">
       <p:transition spd="slow" p14:dur="2000" advClick="0" advTm="5000"/>
     </mc:Choice>
-    <mc:Fallback>
+    <mc:Fallback xmlns="">
       <p:transition spd="slow" advClick="0" advTm="5000"/>
     </mc:Fallback>
   </mc:AlternateContent>
@@ -2298,11 +2302,11 @@
   <p:clrMapOvr>
     <a:masterClrMapping/>
   </p:clrMapOvr>
-  <mc:AlternateContent xmlns:mc="http://schemas.openxmlformats.org/markup-compatibility/2006">
-    <mc:Choice xmlns:p14="http://schemas.microsoft.com/office/powerpoint/2010/main" Requires="p14">
+  <mc:AlternateContent xmlns:mc="http://schemas.openxmlformats.org/markup-compatibility/2006" xmlns:p14="http://schemas.microsoft.com/office/powerpoint/2010/main">
+    <mc:Choice Requires="p14">
       <p:transition spd="slow" p14:dur="2000" advClick="0" advTm="5000"/>
     </mc:Choice>
-    <mc:Fallback>
+    <mc:Fallback xmlns="">
       <p:transition spd="slow" advClick="0" advTm="5000"/>
     </mc:Fallback>
   </mc:AlternateContent>
@@ -2850,11 +2854,11 @@
   <p:sldLayoutIdLst>
     <p:sldLayoutId id="2147483648" r:id="rId1"/>
   </p:sldLayoutIdLst>
-  <mc:AlternateContent xmlns:mc="http://schemas.openxmlformats.org/markup-compatibility/2006">
-    <mc:Choice xmlns:p14="http://schemas.microsoft.com/office/powerpoint/2010/main" Requires="p14">
+  <mc:AlternateContent xmlns:mc="http://schemas.openxmlformats.org/markup-compatibility/2006" xmlns:p14="http://schemas.microsoft.com/office/powerpoint/2010/main">
+    <mc:Choice Requires="p14">
       <p:transition spd="slow" p14:dur="2000" advClick="0" advTm="5000"/>
     </mc:Choice>
-    <mc:Fallback>
+    <mc:Fallback xmlns="">
       <p:transition spd="slow" advClick="0" advTm="5000"/>
     </mc:Fallback>
   </mc:AlternateContent>
@@ -3914,11 +3918,11 @@
   <p:sldLayoutIdLst>
     <p:sldLayoutId id="2147483657" r:id="rId1"/>
   </p:sldLayoutIdLst>
-  <mc:AlternateContent xmlns:mc="http://schemas.openxmlformats.org/markup-compatibility/2006">
-    <mc:Choice xmlns:p14="http://schemas.microsoft.com/office/powerpoint/2010/main" Requires="p14">
+  <mc:AlternateContent xmlns:mc="http://schemas.openxmlformats.org/markup-compatibility/2006" xmlns:p14="http://schemas.microsoft.com/office/powerpoint/2010/main">
+    <mc:Choice Requires="p14">
       <p:transition spd="slow" p14:dur="2000" advClick="0" advTm="5000"/>
     </mc:Choice>
-    <mc:Fallback>
+    <mc:Fallback xmlns="">
       <p:transition spd="slow" advClick="0" advTm="5000"/>
     </mc:Fallback>
   </mc:AlternateContent>
@@ -4499,18 +4503,6 @@
               <a:buFont typeface="Arial"/>
               <a:buNone/>
             </a:pPr>
-            <a:r>
-              <a:rPr lang="en-AU" sz="1800" b="0" i="0" u="none" strike="noStrike" cap="none" dirty="0" smtClean="0">
-                <a:solidFill>
-                  <a:schemeClr val="lt1"/>
-                </a:solidFill>
-                <a:latin typeface="Arial Narrow"/>
-                <a:ea typeface="Arial Narrow"/>
-                <a:cs typeface="Arial Narrow"/>
-                <a:sym typeface="Arial Narrow"/>
-              </a:rPr>
-              <a:t>Friday 3 November 2017</a:t>
-            </a:r>
             <a:endParaRPr sz="1800" b="0" i="0" u="none" strike="noStrike" cap="none" dirty="0">
               <a:solidFill>
                 <a:schemeClr val="lt1"/>
@@ -4528,11 +4520,11 @@
   <p:clrMapOvr>
     <a:masterClrMapping/>
   </p:clrMapOvr>
-  <mc:AlternateContent xmlns:mc="http://schemas.openxmlformats.org/markup-compatibility/2006">
-    <mc:Choice xmlns:p14="http://schemas.microsoft.com/office/powerpoint/2010/main" Requires="p14">
+  <mc:AlternateContent xmlns:mc="http://schemas.openxmlformats.org/markup-compatibility/2006" xmlns:p14="http://schemas.microsoft.com/office/powerpoint/2010/main">
+    <mc:Choice Requires="p14">
       <p:transition spd="slow" p14:dur="2000" advClick="0" advTm="5000"/>
     </mc:Choice>
-    <mc:Fallback>
+    <mc:Fallback xmlns="">
       <p:transition spd="slow" advClick="0" advTm="5000"/>
     </mc:Fallback>
   </mc:AlternateContent>
@@ -4582,36 +4574,40 @@
           </a:p>
         </p:txBody>
       </p:sp>
-      <p:pic>
-        <p:nvPicPr>
-          <p:cNvPr id="6" name="Picture 5"/>
-          <p:cNvPicPr>
-            <a:picLocks noChangeAspect="1"/>
-          </p:cNvPicPr>
+      <p:sp>
+        <p:nvSpPr>
+          <p:cNvPr id="2" name="TextBox 1"/>
+          <p:cNvSpPr txBox="1"/>
           <p:nvPr/>
-        </p:nvPicPr>
-        <p:blipFill>
-          <a:blip r:embed="rId2">
-            <a:extLst>
-              <a:ext uri="{28A0092B-C50C-407E-A947-70E740481C1C}">
-                <a14:useLocalDpi xmlns:a14="http://schemas.microsoft.com/office/drawing/2010/main" val="0"/>
-              </a:ext>
-            </a:extLst>
-          </a:blip>
-          <a:stretch>
-            <a:fillRect/>
-          </a:stretch>
-        </p:blipFill>
+        </p:nvSpPr>
         <p:spPr>
           <a:xfrm>
-            <a:off x="0" y="1044489"/>
-            <a:ext cx="9144000" cy="4539803"/>
+            <a:off x="708454" y="2903837"/>
+            <a:ext cx="7735331" cy="707886"/>
           </a:xfrm>
           <a:prstGeom prst="rect">
             <a:avLst/>
           </a:prstGeom>
+          <a:noFill/>
         </p:spPr>
-      </p:pic>
+        <p:txBody>
+          <a:bodyPr wrap="square" rtlCol="0">
+            <a:spAutoFit/>
+          </a:bodyPr>
+          <a:lstStyle/>
+          <a:p>
+            <a:r>
+              <a:rPr lang="en-US" sz="4000" dirty="0" smtClean="0"/>
+              <a:t>http://</a:t>
+            </a:r>
+            <a:r>
+              <a:rPr lang="en-US" sz="4000" dirty="0" err="1" smtClean="0"/>
+              <a:t>biotraining.erc.monash.edu</a:t>
+            </a:r>
+            <a:endParaRPr lang="en-US" sz="4000" dirty="0"/>
+          </a:p>
+        </p:txBody>
+      </p:sp>
     </p:spTree>
     <p:extLst>
       <p:ext uri="{BB962C8B-B14F-4D97-AF65-F5344CB8AC3E}">
@@ -4622,11 +4618,11 @@
   <p:clrMapOvr>
     <a:masterClrMapping/>
   </p:clrMapOvr>
-  <mc:AlternateContent xmlns:mc="http://schemas.openxmlformats.org/markup-compatibility/2006">
-    <mc:Choice xmlns:p14="http://schemas.microsoft.com/office/powerpoint/2010/main" Requires="p14">
+  <mc:AlternateContent xmlns:mc="http://schemas.openxmlformats.org/markup-compatibility/2006" xmlns:p14="http://schemas.microsoft.com/office/powerpoint/2010/main">
+    <mc:Choice Requires="p14">
       <p:transition spd="slow" p14:dur="2000" advClick="0" advTm="5000"/>
     </mc:Choice>
-    <mc:Fallback>
+    <mc:Fallback xmlns="">
       <p:transition spd="slow" advClick="0" advTm="5000"/>
     </mc:Fallback>
   </mc:AlternateContent>
@@ -4659,315 +4655,46 @@
       </p:grpSpPr>
       <p:sp>
         <p:nvSpPr>
-          <p:cNvPr id="3" name="Title 2"/>
+          <p:cNvPr id="2" name="Text Placeholder 1"/>
           <p:cNvSpPr>
             <a:spLocks noGrp="1"/>
           </p:cNvSpPr>
           <p:nvPr>
-            <p:ph type="title"/>
+            <p:ph type="body" idx="1"/>
           </p:nvPr>
         </p:nvSpPr>
-        <p:spPr/>
+        <p:spPr>
+          <a:xfrm>
+            <a:off x="537815" y="1033553"/>
+            <a:ext cx="8319621" cy="1388372"/>
+          </a:xfrm>
+        </p:spPr>
         <p:txBody>
           <a:bodyPr/>
           <a:lstStyle/>
           <a:p>
             <a:r>
               <a:rPr lang="en-US" dirty="0" smtClean="0"/>
-              <a:t>Upcoming events - Genome </a:t>
+              <a:t>You would have an account and password for </a:t>
+            </a:r>
+            <a:r>
+              <a:rPr lang="en-US" dirty="0" err="1" smtClean="0"/>
+              <a:t>RStudio</a:t>
             </a:r>
             <a:r>
               <a:rPr lang="en-US" dirty="0" smtClean="0"/>
-              <a:t>annotation using Apollo</a:t>
+              <a:t> sent to your email address (Check your spam folder),</a:t>
+            </a:r>
+          </a:p>
+          <a:p>
+            <a:r>
+              <a:rPr lang="en-US" dirty="0" smtClean="0"/>
+              <a:t>Otherwise, tell one of the workshop trainers/helpers.</a:t>
             </a:r>
             <a:endParaRPr lang="en-US" dirty="0"/>
           </a:p>
         </p:txBody>
       </p:sp>
-      <p:pic>
-        <p:nvPicPr>
-          <p:cNvPr id="4" name="Content Placeholder 3"/>
-          <p:cNvPicPr>
-            <a:picLocks noChangeAspect="1"/>
-          </p:cNvPicPr>
-          <p:nvPr/>
-        </p:nvPicPr>
-        <p:blipFill rotWithShape="1">
-          <a:blip r:embed="rId2">
-            <a:extLst>
-              <a:ext uri="{28A0092B-C50C-407E-A947-70E740481C1C}">
-                <a14:useLocalDpi xmlns:a14="http://schemas.microsoft.com/office/drawing/2010/main" val="0"/>
-              </a:ext>
-            </a:extLst>
-          </a:blip>
-          <a:srcRect l="26650" r="29340" b="20360"/>
-          <a:stretch/>
-        </p:blipFill>
-        <p:spPr>
-          <a:xfrm>
-            <a:off x="708454" y="1609301"/>
-            <a:ext cx="1562320" cy="2130804"/>
-          </a:xfrm>
-          <a:prstGeom prst="rect">
-            <a:avLst/>
-          </a:prstGeom>
-          <a:noFill/>
-          <a:ln>
-            <a:noFill/>
-          </a:ln>
-        </p:spPr>
-      </p:pic>
-      <p:pic>
-        <p:nvPicPr>
-          <p:cNvPr id="5" name="Picture 4"/>
-          <p:cNvPicPr>
-            <a:picLocks noChangeAspect="1"/>
-          </p:cNvPicPr>
-          <p:nvPr/>
-        </p:nvPicPr>
-        <p:blipFill rotWithShape="1">
-          <a:blip r:embed="rId3">
-            <a:extLst>
-              <a:ext uri="{28A0092B-C50C-407E-A947-70E740481C1C}">
-                <a14:useLocalDpi xmlns:a14="http://schemas.microsoft.com/office/drawing/2010/main" val="0"/>
-              </a:ext>
-            </a:extLst>
-          </a:blip>
-          <a:srcRect l="-615" r="1"/>
-          <a:stretch/>
-        </p:blipFill>
-        <p:spPr>
-          <a:xfrm>
-            <a:off x="3277709" y="914646"/>
-            <a:ext cx="5409090" cy="3122559"/>
-          </a:xfrm>
-          <a:prstGeom prst="rect">
-            <a:avLst/>
-          </a:prstGeom>
-        </p:spPr>
-      </p:pic>
-      <p:sp>
-        <p:nvSpPr>
-          <p:cNvPr id="6" name="TextBox 5"/>
-          <p:cNvSpPr txBox="1"/>
-          <p:nvPr/>
-        </p:nvSpPr>
-        <p:spPr>
-          <a:xfrm>
-            <a:off x="217377" y="946345"/>
-            <a:ext cx="2100127" cy="369332"/>
-          </a:xfrm>
-          <a:prstGeom prst="rect">
-            <a:avLst/>
-          </a:prstGeom>
-          <a:noFill/>
-        </p:spPr>
-        <p:txBody>
-          <a:bodyPr wrap="none" rtlCol="0">
-            <a:spAutoFit/>
-          </a:bodyPr>
-          <a:lstStyle/>
-          <a:p>
-            <a:r>
-              <a:rPr lang="en-US" dirty="0" smtClean="0"/>
-              <a:t>Training material by:</a:t>
-            </a:r>
-            <a:endParaRPr lang="en-US" dirty="0"/>
-          </a:p>
-        </p:txBody>
-      </p:sp>
-      <p:sp>
-        <p:nvSpPr>
-          <p:cNvPr id="7" name="Rectangle 6"/>
-          <p:cNvSpPr/>
-          <p:nvPr/>
-        </p:nvSpPr>
-        <p:spPr>
-          <a:xfrm>
-            <a:off x="217377" y="4199927"/>
-            <a:ext cx="4405895" cy="1169551"/>
-          </a:xfrm>
-          <a:prstGeom prst="rect">
-            <a:avLst/>
-          </a:prstGeom>
-        </p:spPr>
-        <p:txBody>
-          <a:bodyPr wrap="square">
-            <a:spAutoFit/>
-          </a:bodyPr>
-          <a:lstStyle/>
-          <a:p>
-            <a:r>
-              <a:rPr lang="en-US" dirty="0" err="1" smtClean="0"/>
-              <a:t>Dr</a:t>
-            </a:r>
-            <a:r>
-              <a:rPr lang="en-US" dirty="0" smtClean="0"/>
-              <a:t> Monica Munoz-Torres from </a:t>
-            </a:r>
-          </a:p>
-          <a:p>
-            <a:r>
-              <a:rPr lang="en-US" dirty="0" smtClean="0">
-                <a:hlinkClick r:id="rId4"/>
-              </a:rPr>
-              <a:t>Phoenix Bioinformatics</a:t>
-            </a:r>
-            <a:r>
-              <a:rPr lang="en-US" dirty="0" smtClean="0"/>
-              <a:t> who is an expert in genome annotation, </a:t>
-            </a:r>
-            <a:r>
-              <a:rPr lang="en-US" dirty="0" smtClean="0">
-                <a:hlinkClick r:id="rId5"/>
-              </a:rPr>
-              <a:t>current chair of the International Society for Biocuration Executive Committee</a:t>
-            </a:r>
-            <a:r>
-              <a:rPr lang="en-US" dirty="0" smtClean="0"/>
-              <a:t>, and </a:t>
-            </a:r>
-          </a:p>
-          <a:p>
-            <a:r>
-              <a:rPr lang="en-US" dirty="0" smtClean="0"/>
-              <a:t>former Project Manager of the </a:t>
-            </a:r>
-            <a:r>
-              <a:rPr lang="en-US" dirty="0" smtClean="0">
-                <a:hlinkClick r:id="rId6"/>
-              </a:rPr>
-              <a:t>Apollo Project</a:t>
-            </a:r>
-            <a:r>
-              <a:rPr lang="en-US" dirty="0" smtClean="0"/>
-              <a:t>.</a:t>
-            </a:r>
-            <a:endParaRPr lang="en-US" dirty="0"/>
-          </a:p>
-        </p:txBody>
-      </p:sp>
-      <p:sp>
-        <p:nvSpPr>
-          <p:cNvPr id="8" name="TextBox 7"/>
-          <p:cNvSpPr txBox="1"/>
-          <p:nvPr/>
-        </p:nvSpPr>
-        <p:spPr>
-          <a:xfrm>
-            <a:off x="217377" y="5593755"/>
-            <a:ext cx="5657703" cy="369332"/>
-          </a:xfrm>
-          <a:prstGeom prst="rect">
-            <a:avLst/>
-          </a:prstGeom>
-          <a:noFill/>
-        </p:spPr>
-        <p:txBody>
-          <a:bodyPr wrap="none" rtlCol="0">
-            <a:spAutoFit/>
-          </a:bodyPr>
-          <a:lstStyle/>
-          <a:p>
-            <a:r>
-              <a:rPr lang="en-US" dirty="0" smtClean="0"/>
-              <a:t>For expression of interest email </a:t>
-            </a:r>
-            <a:r>
-              <a:rPr lang="en-US" dirty="0" err="1" smtClean="0"/>
-              <a:t>sonika.tyagi@monash.edu</a:t>
-            </a:r>
-            <a:endParaRPr lang="en-US" dirty="0"/>
-          </a:p>
-        </p:txBody>
-      </p:sp>
-      <p:sp>
-        <p:nvSpPr>
-          <p:cNvPr id="9" name="TextBox 8"/>
-          <p:cNvSpPr txBox="1"/>
-          <p:nvPr/>
-        </p:nvSpPr>
-        <p:spPr>
-          <a:xfrm>
-            <a:off x="5138504" y="4446148"/>
-            <a:ext cx="4843696" cy="923330"/>
-          </a:xfrm>
-          <a:prstGeom prst="rect">
-            <a:avLst/>
-          </a:prstGeom>
-          <a:noFill/>
-        </p:spPr>
-        <p:txBody>
-          <a:bodyPr wrap="square" rtlCol="0">
-            <a:spAutoFit/>
-          </a:bodyPr>
-          <a:lstStyle/>
-          <a:p>
-            <a:r>
-              <a:rPr lang="en-US" dirty="0" smtClean="0"/>
-              <a:t>Date: 21-11-2017</a:t>
-            </a:r>
-          </a:p>
-          <a:p>
-            <a:r>
-              <a:rPr lang="en-US" dirty="0" smtClean="0"/>
-              <a:t>Venue: Clayton Campus</a:t>
-            </a:r>
-          </a:p>
-          <a:p>
-            <a:r>
-              <a:rPr lang="en-US" dirty="0" smtClean="0"/>
-              <a:t>Instructors: Monash Bioinformatics Platform</a:t>
-            </a:r>
-            <a:endParaRPr lang="en-US" dirty="0"/>
-          </a:p>
-        </p:txBody>
-      </p:sp>
-    </p:spTree>
-    <p:extLst>
-      <p:ext uri="{BB962C8B-B14F-4D97-AF65-F5344CB8AC3E}">
-        <p14:creationId xmlns:p14="http://schemas.microsoft.com/office/powerpoint/2010/main" val="1214770446"/>
-      </p:ext>
-    </p:extLst>
-  </p:cSld>
-  <p:clrMapOvr>
-    <a:masterClrMapping/>
-  </p:clrMapOvr>
-  <mc:AlternateContent xmlns:mc="http://schemas.openxmlformats.org/markup-compatibility/2006">
-    <mc:Choice xmlns:p14="http://schemas.microsoft.com/office/powerpoint/2010/main" Requires="p14">
-      <p:transition spd="slow" p14:dur="2000" advClick="0" advTm="5000"/>
-    </mc:Choice>
-    <mc:Fallback>
-      <p:transition spd="slow" advClick="0" advTm="5000"/>
-    </mc:Fallback>
-  </mc:AlternateContent>
-  <p:timing>
-    <p:tnLst>
-      <p:par>
-        <p:cTn id="1" dur="indefinite" restart="never" nodeType="tmRoot"/>
-      </p:par>
-    </p:tnLst>
-  </p:timing>
-</p:sld>
-</file>
-
-<file path=ppt/slides/slide4.xml><?xml version="1.0" encoding="utf-8"?>
-<p:sld xmlns:a="http://schemas.openxmlformats.org/drawingml/2006/main" xmlns:r="http://schemas.openxmlformats.org/officeDocument/2006/relationships" xmlns:p="http://schemas.openxmlformats.org/presentationml/2006/main">
-  <p:cSld>
-    <p:spTree>
-      <p:nvGrpSpPr>
-        <p:cNvPr id="1" name=""/>
-        <p:cNvGrpSpPr/>
-        <p:nvPr/>
-      </p:nvGrpSpPr>
-      <p:grpSpPr>
-        <a:xfrm>
-          <a:off x="0" y="0"/>
-          <a:ext cx="0" cy="0"/>
-          <a:chOff x="0" y="0"/>
-          <a:chExt cx="0" cy="0"/>
-        </a:xfrm>
-      </p:grpSpPr>
       <p:sp>
         <p:nvSpPr>
           <p:cNvPr id="3" name="Title 2"/>
@@ -4983,14 +4710,6 @@
           <a:bodyPr/>
           <a:lstStyle/>
           <a:p>
-            <a:r>
-              <a:rPr lang="en-US" dirty="0" smtClean="0"/>
-              <a:t>Upcoming events - </a:t>
-            </a:r>
-            <a:r>
-              <a:rPr lang="en-US" smtClean="0"/>
-              <a:t>Bioinfosummer</a:t>
-            </a:r>
             <a:endParaRPr lang="en-US" dirty="0"/>
           </a:p>
         </p:txBody>
@@ -5017,8 +4736,8 @@
         </p:blipFill>
         <p:spPr>
           <a:xfrm>
-            <a:off x="0" y="850900"/>
-            <a:ext cx="9144000" cy="5145024"/>
+            <a:off x="0" y="2421925"/>
+            <a:ext cx="9144000" cy="3309318"/>
           </a:xfrm>
           <a:prstGeom prst="rect">
             <a:avLst/>
@@ -5028,28 +4747,21 @@
     </p:spTree>
     <p:extLst>
       <p:ext uri="{BB962C8B-B14F-4D97-AF65-F5344CB8AC3E}">
-        <p14:creationId xmlns:p14="http://schemas.microsoft.com/office/powerpoint/2010/main" val="519853893"/>
+        <p14:creationId xmlns:p14="http://schemas.microsoft.com/office/powerpoint/2010/main" val="61353917"/>
       </p:ext>
     </p:extLst>
   </p:cSld>
   <p:clrMapOvr>
     <a:masterClrMapping/>
   </p:clrMapOvr>
-  <mc:AlternateContent xmlns:mc="http://schemas.openxmlformats.org/markup-compatibility/2006">
-    <mc:Choice xmlns:p14="http://schemas.microsoft.com/office/powerpoint/2010/main" Requires="p14">
+  <mc:AlternateContent xmlns:mc="http://schemas.openxmlformats.org/markup-compatibility/2006" xmlns:p14="http://schemas.microsoft.com/office/powerpoint/2010/main">
+    <mc:Choice Requires="p14">
       <p:transition spd="slow" p14:dur="2000" advClick="0" advTm="5000"/>
     </mc:Choice>
-    <mc:Fallback>
+    <mc:Fallback xmlns="">
       <p:transition spd="slow" advClick="0" advTm="5000"/>
     </mc:Fallback>
   </mc:AlternateContent>
-  <p:timing>
-    <p:tnLst>
-      <p:par>
-        <p:cTn id="1" dur="indefinite" restart="never" nodeType="tmRoot"/>
-      </p:par>
-    </p:tnLst>
-  </p:timing>
 </p:sld>
 </file>
 

</xml_diff>